<commit_message>
Sign out feature tested and complete
</commit_message>
<xml_diff>
--- a/Landing.pptx
+++ b/Landing.pptx
@@ -3344,7 +3344,7 @@
         </p:nvSpPr>
         <p:spPr>
           <a:xfrm>
-            <a:off x="6445128" y="632999"/>
+            <a:off x="6498735" y="632999"/>
             <a:ext cx="107214" cy="111488"/>
           </a:xfrm>
           <a:prstGeom prst="rect">
@@ -3391,7 +3391,7 @@
         </p:nvSpPr>
         <p:spPr>
           <a:xfrm>
-            <a:off x="6445128" y="577255"/>
+            <a:off x="6498735" y="577255"/>
             <a:ext cx="1113363" cy="200055"/>
           </a:xfrm>
           <a:prstGeom prst="rect">
@@ -3828,9 +3828,16 @@
                 <a:latin typeface="American Typewriter"/>
                 <a:cs typeface="American Typewriter"/>
               </a:rPr>
-              <a:t>throwback</a:t>
-            </a:r>
-            <a:endParaRPr lang="en-US" sz="3200" dirty="0">
+              <a:t>throw</a:t>
+            </a:r>
+            <a:r>
+              <a:rPr lang="en-US" sz="3200" i="1" dirty="0" smtClean="0">
+                <a:latin typeface="American Typewriter"/>
+                <a:cs typeface="American Typewriter"/>
+              </a:rPr>
+              <a:t>back</a:t>
+            </a:r>
+            <a:endParaRPr lang="en-US" sz="3200" i="1" dirty="0">
               <a:latin typeface="American Typewriter"/>
               <a:cs typeface="American Typewriter"/>
             </a:endParaRPr>
@@ -3901,7 +3908,7 @@
         </mc:AlternateContent>
         <p:spPr>
           <a:xfrm>
-            <a:off x="353203" y="3058361"/>
+            <a:off x="352430" y="5848842"/>
             <a:ext cx="704088" cy="704088"/>
           </a:xfrm>
           <a:prstGeom prst="rect">
@@ -3937,7 +3944,7 @@
         </mc:AlternateContent>
         <p:spPr>
           <a:xfrm>
-            <a:off x="353203" y="2354273"/>
+            <a:off x="352430" y="3948833"/>
             <a:ext cx="704088" cy="704088"/>
           </a:xfrm>
           <a:prstGeom prst="rect">
@@ -3973,7 +3980,7 @@
         </mc:AlternateContent>
         <p:spPr>
           <a:xfrm>
-            <a:off x="353203" y="1650185"/>
+            <a:off x="352430" y="2410382"/>
             <a:ext cx="704088" cy="704088"/>
           </a:xfrm>
           <a:prstGeom prst="rect">

</xml_diff>